<commit_message>
Fix typo for proposal.md, add in layout code for app.py, update new app sketch layout in pptx
</commit_message>
<xml_diff>
--- a/reports/532.pptx
+++ b/reports/532.pptx
@@ -4777,59 +4777,6 @@
       </p:sp>
       <p:sp>
         <p:nvSpPr>
-          <p:cNvPr id="20" name="TextBox 19">
-            <a:extLst>
-              <a:ext uri="{FF2B5EF4-FFF2-40B4-BE49-F238E27FC236}">
-                <a16:creationId xmlns:a16="http://schemas.microsoft.com/office/drawing/2014/main" id="{60F6DE95-F621-412C-8966-78DC7C024DB5}"/>
-              </a:ext>
-            </a:extLst>
-          </p:cNvPr>
-          <p:cNvSpPr txBox="1"/>
-          <p:nvPr/>
-        </p:nvSpPr>
-        <p:spPr>
-          <a:xfrm>
-            <a:off x="4869068" y="42393"/>
-            <a:ext cx="7322932" cy="923330"/>
-          </a:xfrm>
-          <a:prstGeom prst="rect">
-            <a:avLst/>
-          </a:prstGeom>
-          <a:noFill/>
-        </p:spPr>
-        <p:txBody>
-          <a:bodyPr wrap="square" rtlCol="0">
-            <a:spAutoFit/>
-          </a:bodyPr>
-          <a:lstStyle/>
-          <a:p>
-            <a:r>
-              <a:rPr lang="en-SG" b="1" dirty="0">
-                <a:latin typeface="MV Boli" panose="02000500030200090000" pitchFamily="2" charset="0"/>
-                <a:cs typeface="MV Boli" panose="02000500030200090000" pitchFamily="2" charset="0"/>
-              </a:rPr>
-              <a:t>(Tooltip on movies name, </a:t>
-            </a:r>
-          </a:p>
-          <a:p>
-            <a:r>
-              <a:rPr lang="en-SG" b="1" dirty="0">
-                <a:latin typeface="MV Boli" panose="02000500030200090000" pitchFamily="2" charset="0"/>
-                <a:cs typeface="MV Boli" panose="02000500030200090000" pitchFamily="2" charset="0"/>
-              </a:rPr>
-              <a:t>Studios, etc.), click on the studio and reflect on the scatter plot</a:t>
-            </a:r>
-          </a:p>
-          <a:p>
-            <a:endParaRPr lang="en-SG" b="1" dirty="0">
-              <a:latin typeface="MV Boli" panose="02000500030200090000" pitchFamily="2" charset="0"/>
-              <a:cs typeface="MV Boli" panose="02000500030200090000" pitchFamily="2" charset="0"/>
-            </a:endParaRPr>
-          </a:p>
-        </p:txBody>
-      </p:sp>
-      <p:sp>
-        <p:nvSpPr>
           <p:cNvPr id="38" name="Action Button: Go Back or Previous 37">
             <a:hlinkClick r:id="" action="ppaction://hlinkshowjump?jump=previousslide" highlightClick="1"/>
             <a:extLst>
@@ -6025,6 +5972,59 @@
           </a:p>
         </p:txBody>
       </p:sp>
+      <p:sp>
+        <p:nvSpPr>
+          <p:cNvPr id="20" name="TextBox 19">
+            <a:extLst>
+              <a:ext uri="{FF2B5EF4-FFF2-40B4-BE49-F238E27FC236}">
+                <a16:creationId xmlns:a16="http://schemas.microsoft.com/office/drawing/2014/main" id="{60F6DE95-F621-412C-8966-78DC7C024DB5}"/>
+              </a:ext>
+            </a:extLst>
+          </p:cNvPr>
+          <p:cNvSpPr txBox="1"/>
+          <p:nvPr/>
+        </p:nvSpPr>
+        <p:spPr>
+          <a:xfrm>
+            <a:off x="3856382" y="-21572"/>
+            <a:ext cx="7322932" cy="923330"/>
+          </a:xfrm>
+          <a:prstGeom prst="rect">
+            <a:avLst/>
+          </a:prstGeom>
+          <a:noFill/>
+        </p:spPr>
+        <p:txBody>
+          <a:bodyPr wrap="square" rtlCol="0">
+            <a:spAutoFit/>
+          </a:bodyPr>
+          <a:lstStyle/>
+          <a:p>
+            <a:r>
+              <a:rPr lang="en-SG" b="1" dirty="0">
+                <a:latin typeface="MV Boli" panose="02000500030200090000" pitchFamily="2" charset="0"/>
+                <a:cs typeface="MV Boli" panose="02000500030200090000" pitchFamily="2" charset="0"/>
+              </a:rPr>
+              <a:t>(Tooltip on movies name, </a:t>
+            </a:r>
+          </a:p>
+          <a:p>
+            <a:r>
+              <a:rPr lang="en-SG" b="1" dirty="0">
+                <a:latin typeface="MV Boli" panose="02000500030200090000" pitchFamily="2" charset="0"/>
+                <a:cs typeface="MV Boli" panose="02000500030200090000" pitchFamily="2" charset="0"/>
+              </a:rPr>
+              <a:t>Studios, etc.), click on the studio and reflect on the scatter plot</a:t>
+            </a:r>
+          </a:p>
+          <a:p>
+            <a:endParaRPr lang="en-SG" b="1" dirty="0">
+              <a:latin typeface="MV Boli" panose="02000500030200090000" pitchFamily="2" charset="0"/>
+              <a:cs typeface="MV Boli" panose="02000500030200090000" pitchFamily="2" charset="0"/>
+            </a:endParaRPr>
+          </a:p>
+        </p:txBody>
+      </p:sp>
     </p:spTree>
     <p:extLst>
       <p:ext uri="{BB962C8B-B14F-4D97-AF65-F5344CB8AC3E}">

</xml_diff>